<commit_message>
jeng - ch4 added verbiages to diagrams and updated diagrams
</commit_message>
<xml_diff>
--- a/jeng/diagrams/diagrams.pptx
+++ b/jeng/diagrams/diagrams.pptx
@@ -113,6 +113,11 @@
       </a:defRPr>
     </a:lvl9pPr>
   </p:defaultTextStyle>
+  <p:extLst>
+    <p:ext uri="{EFAFB233-063F-42B5-8137-9DF3F51BA10A}">
+      <p15:sldGuideLst xmlns:p15="http://schemas.microsoft.com/office/powerpoint/2012/main"/>
+    </p:ext>
+  </p:extLst>
 </p:presentation>
 </file>
 
@@ -1251,7 +1256,7 @@
           <a:p>
             <a:fld id="{DA87CA7B-2BFA-418D-ADE0-DE4816580CF5}" type="datetimeFigureOut">
               <a:rPr lang="en-US" smtClean="0"/>
-              <a:t>8/4/2021</a:t>
+              <a:t>8/8/2021</a:t>
             </a:fld>
             <a:endParaRPr lang="en-US"/>
           </a:p>
@@ -1449,7 +1454,7 @@
           <a:p>
             <a:fld id="{DA87CA7B-2BFA-418D-ADE0-DE4816580CF5}" type="datetimeFigureOut">
               <a:rPr lang="en-US" smtClean="0"/>
-              <a:t>8/4/2021</a:t>
+              <a:t>8/8/2021</a:t>
             </a:fld>
             <a:endParaRPr lang="en-US"/>
           </a:p>
@@ -1657,7 +1662,7 @@
           <a:p>
             <a:fld id="{DA87CA7B-2BFA-418D-ADE0-DE4816580CF5}" type="datetimeFigureOut">
               <a:rPr lang="en-US" smtClean="0"/>
-              <a:t>8/4/2021</a:t>
+              <a:t>8/8/2021</a:t>
             </a:fld>
             <a:endParaRPr lang="en-US"/>
           </a:p>
@@ -1855,7 +1860,7 @@
           <a:p>
             <a:fld id="{DA87CA7B-2BFA-418D-ADE0-DE4816580CF5}" type="datetimeFigureOut">
               <a:rPr lang="en-US" smtClean="0"/>
-              <a:t>8/4/2021</a:t>
+              <a:t>8/8/2021</a:t>
             </a:fld>
             <a:endParaRPr lang="en-US"/>
           </a:p>
@@ -2130,7 +2135,7 @@
           <a:p>
             <a:fld id="{DA87CA7B-2BFA-418D-ADE0-DE4816580CF5}" type="datetimeFigureOut">
               <a:rPr lang="en-US" smtClean="0"/>
-              <a:t>8/4/2021</a:t>
+              <a:t>8/8/2021</a:t>
             </a:fld>
             <a:endParaRPr lang="en-US"/>
           </a:p>
@@ -2395,7 +2400,7 @@
           <a:p>
             <a:fld id="{DA87CA7B-2BFA-418D-ADE0-DE4816580CF5}" type="datetimeFigureOut">
               <a:rPr lang="en-US" smtClean="0"/>
-              <a:t>8/4/2021</a:t>
+              <a:t>8/8/2021</a:t>
             </a:fld>
             <a:endParaRPr lang="en-US"/>
           </a:p>
@@ -2807,7 +2812,7 @@
           <a:p>
             <a:fld id="{DA87CA7B-2BFA-418D-ADE0-DE4816580CF5}" type="datetimeFigureOut">
               <a:rPr lang="en-US" smtClean="0"/>
-              <a:t>8/4/2021</a:t>
+              <a:t>8/8/2021</a:t>
             </a:fld>
             <a:endParaRPr lang="en-US"/>
           </a:p>
@@ -2948,7 +2953,7 @@
           <a:p>
             <a:fld id="{DA87CA7B-2BFA-418D-ADE0-DE4816580CF5}" type="datetimeFigureOut">
               <a:rPr lang="en-US" smtClean="0"/>
-              <a:t>8/4/2021</a:t>
+              <a:t>8/8/2021</a:t>
             </a:fld>
             <a:endParaRPr lang="en-US"/>
           </a:p>
@@ -3061,7 +3066,7 @@
           <a:p>
             <a:fld id="{DA87CA7B-2BFA-418D-ADE0-DE4816580CF5}" type="datetimeFigureOut">
               <a:rPr lang="en-US" smtClean="0"/>
-              <a:t>8/4/2021</a:t>
+              <a:t>8/8/2021</a:t>
             </a:fld>
             <a:endParaRPr lang="en-US"/>
           </a:p>
@@ -3372,7 +3377,7 @@
           <a:p>
             <a:fld id="{DA87CA7B-2BFA-418D-ADE0-DE4816580CF5}" type="datetimeFigureOut">
               <a:rPr lang="en-US" smtClean="0"/>
-              <a:t>8/4/2021</a:t>
+              <a:t>8/8/2021</a:t>
             </a:fld>
             <a:endParaRPr lang="en-US"/>
           </a:p>
@@ -3660,7 +3665,7 @@
           <a:p>
             <a:fld id="{DA87CA7B-2BFA-418D-ADE0-DE4816580CF5}" type="datetimeFigureOut">
               <a:rPr lang="en-US" smtClean="0"/>
-              <a:t>8/4/2021</a:t>
+              <a:t>8/8/2021</a:t>
             </a:fld>
             <a:endParaRPr lang="en-US"/>
           </a:p>
@@ -3901,7 +3906,7 @@
           <a:p>
             <a:fld id="{DA87CA7B-2BFA-418D-ADE0-DE4816580CF5}" type="datetimeFigureOut">
               <a:rPr lang="en-US" smtClean="0"/>
-              <a:t>8/4/2021</a:t>
+              <a:t>8/8/2021</a:t>
             </a:fld>
             <a:endParaRPr lang="en-US"/>
           </a:p>
@@ -5799,83 +5804,6 @@
           </a:fontRef>
         </p:style>
       </p:cxnSp>
-      <p:cxnSp>
-        <p:nvCxnSpPr>
-          <p:cNvPr id="17" name="Straight Arrow Connector 16">
-            <a:extLst>
-              <a:ext uri="{FF2B5EF4-FFF2-40B4-BE49-F238E27FC236}">
-                <a16:creationId xmlns:a16="http://schemas.microsoft.com/office/drawing/2014/main" id="{98E8F382-4616-4551-A511-6CCD7CF6A3F8}"/>
-              </a:ext>
-            </a:extLst>
-          </p:cNvPr>
-          <p:cNvCxnSpPr>
-            <a:cxnSpLocks/>
-          </p:cNvCxnSpPr>
-          <p:nvPr/>
-        </p:nvCxnSpPr>
-        <p:spPr>
-          <a:xfrm>
-            <a:off x="1208933" y="1995854"/>
-            <a:ext cx="1966553" cy="0"/>
-          </a:xfrm>
-          <a:prstGeom prst="straightConnector1">
-            <a:avLst/>
-          </a:prstGeom>
-          <a:ln>
-            <a:headEnd type="triangle"/>
-            <a:tailEnd type="triangle"/>
-          </a:ln>
-        </p:spPr>
-        <p:style>
-          <a:lnRef idx="1">
-            <a:schemeClr val="accent1"/>
-          </a:lnRef>
-          <a:fillRef idx="0">
-            <a:schemeClr val="accent1"/>
-          </a:fillRef>
-          <a:effectRef idx="0">
-            <a:schemeClr val="accent1"/>
-          </a:effectRef>
-          <a:fontRef idx="minor">
-            <a:schemeClr val="tx1"/>
-          </a:fontRef>
-        </p:style>
-      </p:cxnSp>
-      <p:sp>
-        <p:nvSpPr>
-          <p:cNvPr id="18" name="TextBox 17">
-            <a:extLst>
-              <a:ext uri="{FF2B5EF4-FFF2-40B4-BE49-F238E27FC236}">
-                <a16:creationId xmlns:a16="http://schemas.microsoft.com/office/drawing/2014/main" id="{03DA2E44-9F3D-46EE-B10F-5CEDAD0898B6}"/>
-              </a:ext>
-            </a:extLst>
-          </p:cNvPr>
-          <p:cNvSpPr txBox="1"/>
-          <p:nvPr/>
-        </p:nvSpPr>
-        <p:spPr>
-          <a:xfrm>
-            <a:off x="1202539" y="1675076"/>
-            <a:ext cx="3418839" cy="307777"/>
-          </a:xfrm>
-          <a:prstGeom prst="rect">
-            <a:avLst/>
-          </a:prstGeom>
-          <a:noFill/>
-        </p:spPr>
-        <p:txBody>
-          <a:bodyPr wrap="square" rtlCol="0">
-            <a:spAutoFit/>
-          </a:bodyPr>
-          <a:lstStyle/>
-          <a:p>
-            <a:r>
-              <a:rPr lang="en-US" sz="1400" dirty="0"/>
-              <a:t>1. Perform tests or vaccination</a:t>
-            </a:r>
-          </a:p>
-        </p:txBody>
-      </p:sp>
       <p:sp>
         <p:nvSpPr>
           <p:cNvPr id="19" name="Rectangle: Rounded Corners 18">
@@ -5946,7 +5874,7 @@
         </p:nvCxnSpPr>
         <p:spPr>
           <a:xfrm flipH="1">
-            <a:off x="3174968" y="4293576"/>
+            <a:off x="3174968" y="3973536"/>
             <a:ext cx="8021509" cy="0"/>
           </a:xfrm>
           <a:prstGeom prst="straightConnector1">
@@ -5980,12 +5908,14 @@
               </a:ext>
             </a:extLst>
           </p:cNvPr>
-          <p:cNvCxnSpPr/>
+          <p:cNvCxnSpPr>
+            <a:cxnSpLocks/>
+          </p:cNvCxnSpPr>
           <p:nvPr/>
         </p:nvCxnSpPr>
         <p:spPr>
           <a:xfrm>
-            <a:off x="1239715" y="2444266"/>
+            <a:off x="1215331" y="2514370"/>
             <a:ext cx="4009289" cy="0"/>
           </a:xfrm>
           <a:prstGeom prst="straightConnector1">
@@ -6024,7 +5954,7 @@
         </p:nvSpPr>
         <p:spPr>
           <a:xfrm>
-            <a:off x="1208932" y="2149743"/>
+            <a:off x="1208932" y="2219847"/>
             <a:ext cx="3546924" cy="307777"/>
           </a:xfrm>
           <a:prstGeom prst="rect">
@@ -6040,7 +5970,7 @@
           <a:p>
             <a:r>
               <a:rPr lang="en-US" sz="1400" dirty="0"/>
-              <a:t>2. Send medical files to web app</a:t>
+              <a:t>B.1. Upload files to web app</a:t>
             </a:r>
           </a:p>
         </p:txBody>
@@ -6061,8 +5991,8 @@
         </p:nvCxnSpPr>
         <p:spPr>
           <a:xfrm>
-            <a:off x="5249004" y="2763720"/>
-            <a:ext cx="2073519" cy="0"/>
+            <a:off x="5220086" y="3011893"/>
+            <a:ext cx="2102435" cy="0"/>
           </a:xfrm>
           <a:prstGeom prst="straightConnector1">
             <a:avLst/>
@@ -6100,8 +6030,8 @@
         </p:nvSpPr>
         <p:spPr>
           <a:xfrm>
-            <a:off x="5220075" y="2236848"/>
-            <a:ext cx="2198262" cy="523220"/>
+            <a:off x="5211170" y="2273229"/>
+            <a:ext cx="2469787" cy="738664"/>
           </a:xfrm>
           <a:prstGeom prst="rect">
             <a:avLst/>
@@ -6116,23 +6046,7 @@
           <a:p>
             <a:r>
               <a:rPr lang="en-US" sz="1400" dirty="0"/>
-              <a:t>3. Encrypt and upload data to </a:t>
-            </a:r>
-            <a:r>
-              <a:rPr lang="en-US" sz="1400" dirty="0" err="1"/>
-              <a:t>ipfs</a:t>
-            </a:r>
-            <a:r>
-              <a:rPr lang="en-US" sz="1400" dirty="0"/>
-              <a:t> and get </a:t>
-            </a:r>
-            <a:r>
-              <a:rPr lang="en-US" sz="1400" dirty="0" err="1"/>
-              <a:t>ipfs</a:t>
-            </a:r>
-            <a:r>
-              <a:rPr lang="en-US" sz="1400" dirty="0"/>
-              <a:t> hash</a:t>
+              <a:t>B.2. Get public key of patient from app db. Encrypt file with key and upload to IPFS</a:t>
             </a:r>
           </a:p>
         </p:txBody>
@@ -6153,8 +6067,8 @@
         </p:nvCxnSpPr>
         <p:spPr>
           <a:xfrm>
-            <a:off x="5239978" y="3429000"/>
-            <a:ext cx="4049099" cy="0"/>
+            <a:off x="5224738" y="3550920"/>
+            <a:ext cx="4033556" cy="0"/>
           </a:xfrm>
           <a:prstGeom prst="straightConnector1">
             <a:avLst/>
@@ -6192,7 +6106,7 @@
         </p:nvSpPr>
         <p:spPr>
           <a:xfrm>
-            <a:off x="5202267" y="2934486"/>
+            <a:off x="5202267" y="3056406"/>
             <a:ext cx="1917195" cy="523220"/>
           </a:xfrm>
           <a:prstGeom prst="rect">
@@ -6208,15 +6122,7 @@
           <a:p>
             <a:r>
               <a:rPr lang="en-US" sz="1400" dirty="0"/>
-              <a:t>4. Update blockchain with latest </a:t>
-            </a:r>
-            <a:r>
-              <a:rPr lang="en-US" sz="1400" dirty="0" err="1"/>
-              <a:t>ipfs</a:t>
-            </a:r>
-            <a:r>
-              <a:rPr lang="en-US" sz="1400" dirty="0"/>
-              <a:t> details</a:t>
+              <a:t>B.3. Update blockchain with latest IPFS details</a:t>
             </a:r>
           </a:p>
         </p:txBody>
@@ -6235,7 +6141,7 @@
         </p:nvSpPr>
         <p:spPr>
           <a:xfrm>
-            <a:off x="9326577" y="3985799"/>
+            <a:off x="9326577" y="3665759"/>
             <a:ext cx="2054540" cy="307777"/>
           </a:xfrm>
           <a:prstGeom prst="rect">
@@ -6251,7 +6157,7 @@
           <a:p>
             <a:r>
               <a:rPr lang="en-US" sz="1400" dirty="0"/>
-              <a:t>6. Request for records</a:t>
+              <a:t>C.1. Request for records</a:t>
             </a:r>
           </a:p>
         </p:txBody>
@@ -6272,7 +6178,7 @@
         </p:nvCxnSpPr>
         <p:spPr>
           <a:xfrm>
-            <a:off x="3184928" y="4844553"/>
+            <a:off x="3184928" y="4524513"/>
             <a:ext cx="2034441" cy="0"/>
           </a:xfrm>
           <a:prstGeom prst="straightConnector1">
@@ -6311,7 +6217,7 @@
         </p:nvSpPr>
         <p:spPr>
           <a:xfrm>
-            <a:off x="3174253" y="4332062"/>
+            <a:off x="3174253" y="4012022"/>
             <a:ext cx="2216072" cy="523220"/>
           </a:xfrm>
           <a:prstGeom prst="rect">
@@ -6327,7 +6233,7 @@
           <a:p>
             <a:r>
               <a:rPr lang="en-US" sz="1400" dirty="0"/>
-              <a:t>7. Provide keys for access request</a:t>
+              <a:t>C.2 Provide private key for access request</a:t>
             </a:r>
           </a:p>
         </p:txBody>
@@ -6538,7 +6444,7 @@
         </p:nvCxnSpPr>
         <p:spPr>
           <a:xfrm>
-            <a:off x="5219369" y="5111262"/>
+            <a:off x="5219369" y="5012202"/>
             <a:ext cx="4038925" cy="0"/>
           </a:xfrm>
           <a:prstGeom prst="straightConnector1">
@@ -6577,8 +6483,8 @@
         </p:nvSpPr>
         <p:spPr>
           <a:xfrm>
-            <a:off x="5202267" y="4649604"/>
-            <a:ext cx="2216070" cy="523220"/>
+            <a:off x="5202266" y="4550544"/>
+            <a:ext cx="2631093" cy="523220"/>
           </a:xfrm>
           <a:prstGeom prst="rect">
             <a:avLst/>
@@ -6593,15 +6499,7 @@
           <a:p>
             <a:r>
               <a:rPr lang="en-US" sz="1400" dirty="0"/>
-              <a:t>8. Validate and retrieve requested </a:t>
-            </a:r>
-            <a:r>
-              <a:rPr lang="en-US" sz="1400" dirty="0" err="1"/>
-              <a:t>ipfs</a:t>
-            </a:r>
-            <a:r>
-              <a:rPr lang="en-US" sz="1400" dirty="0"/>
-              <a:t> file metadata</a:t>
+              <a:t>C.3. Validate and retrieve requested IPFS file metadata</a:t>
             </a:r>
           </a:p>
         </p:txBody>
@@ -6622,7 +6520,7 @@
         </p:nvCxnSpPr>
         <p:spPr>
           <a:xfrm>
-            <a:off x="5219369" y="5457093"/>
+            <a:off x="5219369" y="5358033"/>
             <a:ext cx="2103152" cy="0"/>
           </a:xfrm>
           <a:prstGeom prst="straightConnector1">
@@ -6661,8 +6559,8 @@
         </p:nvSpPr>
         <p:spPr>
           <a:xfrm>
-            <a:off x="5239978" y="5214950"/>
-            <a:ext cx="2033737" cy="307777"/>
+            <a:off x="5239978" y="5115890"/>
+            <a:ext cx="2033737" cy="523220"/>
           </a:xfrm>
           <a:prstGeom prst="rect">
             <a:avLst/>
@@ -6677,7 +6575,7 @@
           <a:p>
             <a:r>
               <a:rPr lang="en-US" sz="1400" dirty="0"/>
-              <a:t>9. Retrieve file requested</a:t>
+              <a:t>C.4. Retrieve file requested</a:t>
             </a:r>
           </a:p>
         </p:txBody>
@@ -6698,7 +6596,7 @@
         </p:nvCxnSpPr>
         <p:spPr>
           <a:xfrm flipH="1" flipV="1">
-            <a:off x="3174256" y="3681986"/>
+            <a:off x="3174256" y="2115550"/>
             <a:ext cx="2045113" cy="14085"/>
           </a:xfrm>
           <a:prstGeom prst="straightConnector1">
@@ -6737,8 +6635,8 @@
         </p:nvSpPr>
         <p:spPr>
           <a:xfrm>
-            <a:off x="3147635" y="3392915"/>
-            <a:ext cx="2412185" cy="307777"/>
+            <a:off x="3174253" y="1624030"/>
+            <a:ext cx="2412185" cy="523220"/>
           </a:xfrm>
           <a:prstGeom prst="rect">
             <a:avLst/>
@@ -6753,7 +6651,13 @@
           <a:p>
             <a:r>
               <a:rPr lang="en-US" sz="1400" dirty="0"/>
-              <a:t>5. Generates distribution keys</a:t>
+              <a:t>A. Generates public and</a:t>
+            </a:r>
+          </a:p>
+          <a:p>
+            <a:r>
+              <a:rPr lang="en-US" sz="1400" dirty="0"/>
+              <a:t>private keys</a:t>
             </a:r>
           </a:p>
         </p:txBody>
@@ -8095,6 +7999,21 @@
 </file>
 
 <file path=customXml/item1.xml><?xml version="1.0" encoding="utf-8"?>
+<p:properties xmlns:p="http://schemas.microsoft.com/office/2006/metadata/properties" xmlns:xsi="http://www.w3.org/2001/XMLSchema-instance" xmlns:pc="http://schemas.microsoft.com/office/infopath/2007/PartnerControls">
+  <documentManagement/>
+</p:properties>
+</file>
+
+<file path=customXml/item2.xml><?xml version="1.0" encoding="utf-8"?>
+<?mso-contentType ?>
+<FormTemplates xmlns="http://schemas.microsoft.com/sharepoint/v3/contenttype/forms">
+  <Display>DocumentLibraryForm</Display>
+  <Edit>DocumentLibraryForm</Edit>
+  <New>DocumentLibraryForm</New>
+</FormTemplates>
+</file>
+
+<file path=customXml/item3.xml><?xml version="1.0" encoding="utf-8"?>
 <ct:contentTypeSchema xmlns:ct="http://schemas.microsoft.com/office/2006/metadata/contentType" xmlns:ma="http://schemas.microsoft.com/office/2006/metadata/properties/metaAttributes" ct:_="" ma:_="" ma:contentTypeName="Document" ma:contentTypeID="0x0101003FCFC46E09422143927FC61844892B86" ma:contentTypeVersion="13" ma:contentTypeDescription="Create a new document." ma:contentTypeScope="" ma:versionID="a613eb1237c7bd0836dfce9e85c6bf39">
   <xsd:schema xmlns:xsd="http://www.w3.org/2001/XMLSchema" xmlns:xs="http://www.w3.org/2001/XMLSchema" xmlns:p="http://schemas.microsoft.com/office/2006/metadata/properties" xmlns:ns3="506513cb-6710-443c-bec9-ee4f420b7db5" xmlns:ns4="d4b13a50-29f6-4641-a509-719dcdfd6be2" targetNamespace="http://schemas.microsoft.com/office/2006/metadata/properties" ma:root="true" ma:fieldsID="50102a79bb0f103d92946c7f5f9d553b" ns3:_="" ns4:_="">
     <xsd:import namespace="506513cb-6710-443c-bec9-ee4f420b7db5"/>
@@ -8317,22 +8236,32 @@
 </ct:contentTypeSchema>
 </file>
 
-<file path=customXml/item2.xml><?xml version="1.0" encoding="utf-8"?>
-<?mso-contentType ?>
-<FormTemplates xmlns="http://schemas.microsoft.com/sharepoint/v3/contenttype/forms">
-  <Display>DocumentLibraryForm</Display>
-  <Edit>DocumentLibraryForm</Edit>
-  <New>DocumentLibraryForm</New>
-</FormTemplates>
+<file path=customXml/itemProps1.xml><?xml version="1.0" encoding="utf-8"?>
+<ds:datastoreItem xmlns:ds="http://schemas.openxmlformats.org/officeDocument/2006/customXml" ds:itemID="{12532B29-5258-4CBD-AD70-CD426ECCBA21}">
+  <ds:schemaRefs>
+    <ds:schemaRef ds:uri="http://purl.org/dc/terms/"/>
+    <ds:schemaRef ds:uri="http://schemas.microsoft.com/office/2006/documentManagement/types"/>
+    <ds:schemaRef ds:uri="d4b13a50-29f6-4641-a509-719dcdfd6be2"/>
+    <ds:schemaRef ds:uri="506513cb-6710-443c-bec9-ee4f420b7db5"/>
+    <ds:schemaRef ds:uri="http://purl.org/dc/elements/1.1/"/>
+    <ds:schemaRef ds:uri="http://schemas.microsoft.com/office/2006/metadata/properties"/>
+    <ds:schemaRef ds:uri="http://schemas.microsoft.com/office/infopath/2007/PartnerControls"/>
+    <ds:schemaRef ds:uri="http://schemas.openxmlformats.org/package/2006/metadata/core-properties"/>
+    <ds:schemaRef ds:uri="http://www.w3.org/XML/1998/namespace"/>
+    <ds:schemaRef ds:uri="http://purl.org/dc/dcmitype/"/>
+  </ds:schemaRefs>
+</ds:datastoreItem>
 </file>
 
-<file path=customXml/item3.xml><?xml version="1.0" encoding="utf-8"?>
-<p:properties xmlns:p="http://schemas.microsoft.com/office/2006/metadata/properties" xmlns:xsi="http://www.w3.org/2001/XMLSchema-instance" xmlns:pc="http://schemas.microsoft.com/office/infopath/2007/PartnerControls">
-  <documentManagement/>
-</p:properties>
+<file path=customXml/itemProps2.xml><?xml version="1.0" encoding="utf-8"?>
+<ds:datastoreItem xmlns:ds="http://schemas.openxmlformats.org/officeDocument/2006/customXml" ds:itemID="{019505F6-070F-40C7-9A60-8A37A56EF778}">
+  <ds:schemaRefs>
+    <ds:schemaRef ds:uri="http://schemas.microsoft.com/sharepoint/v3/contenttype/forms"/>
+  </ds:schemaRefs>
+</ds:datastoreItem>
 </file>
 
-<file path=customXml/itemProps1.xml><?xml version="1.0" encoding="utf-8"?>
+<file path=customXml/itemProps3.xml><?xml version="1.0" encoding="utf-8"?>
 <ds:datastoreItem xmlns:ds="http://schemas.openxmlformats.org/officeDocument/2006/customXml" ds:itemID="{F3D0DD1F-3749-4490-BD75-E6C42F942D6E}">
   <ds:schemaRefs>
     <ds:schemaRef ds:uri="http://schemas.microsoft.com/office/2006/metadata/contentType"/>
@@ -8349,21 +8278,4 @@
     <ds:schemaRef ds:uri="http://schemas.microsoft.com/internal/obd"/>
   </ds:schemaRefs>
 </ds:datastoreItem>
-</file>
-
-<file path=customXml/itemProps2.xml><?xml version="1.0" encoding="utf-8"?>
-<ds:datastoreItem xmlns:ds="http://schemas.openxmlformats.org/officeDocument/2006/customXml" ds:itemID="{019505F6-070F-40C7-9A60-8A37A56EF778}">
-  <ds:schemaRefs>
-    <ds:schemaRef ds:uri="http://schemas.microsoft.com/sharepoint/v3/contenttype/forms"/>
-  </ds:schemaRefs>
-</ds:datastoreItem>
-</file>
-
-<file path=customXml/itemProps3.xml><?xml version="1.0" encoding="utf-8"?>
-<ds:datastoreItem xmlns:ds="http://schemas.openxmlformats.org/officeDocument/2006/customXml" ds:itemID="{12532B29-5258-4CBD-AD70-CD426ECCBA21}">
-  <ds:schemaRefs>
-    <ds:schemaRef ds:uri="http://schemas.microsoft.com/office/2006/metadata/properties"/>
-    <ds:schemaRef ds:uri="http://schemas.microsoft.com/office/infopath/2007/PartnerControls"/>
-  </ds:schemaRefs>
-</ds:datastoreItem>
 </file>
</xml_diff>

<commit_message>
jeng - ch4 updated transaction diagram
</commit_message>
<xml_diff>
--- a/jeng/diagrams/diagrams.pptx
+++ b/jeng/diagrams/diagrams.pptx
@@ -5475,7 +5475,7 @@
           <a:p>
             <a:r>
               <a:rPr lang="en-US" dirty="0"/>
-              <a:t>Data flow diagram</a:t>
+              <a:t>operational</a:t>
             </a:r>
           </a:p>
         </p:txBody>
@@ -6560,7 +6560,7 @@
         <p:spPr>
           <a:xfrm>
             <a:off x="5239978" y="5115890"/>
-            <a:ext cx="2033737" cy="523220"/>
+            <a:ext cx="2724377" cy="307777"/>
           </a:xfrm>
           <a:prstGeom prst="rect">
             <a:avLst/>

</xml_diff>